<commit_message>
add meta to slides
</commit_message>
<xml_diff>
--- a/vuejs-2.0.pptx
+++ b/vuejs-2.0.pptx
@@ -437,7 +437,7 @@
           <a:p>
             <a:fld id="{C39C172E-A8B5-46F6-B05C-DFA3E2E0F207}" type="datetimeFigureOut">
               <a:rPr lang="en-US" smtClean="0"/>
-              <a:t>4/5/2018</a:t>
+              <a:t>4/6/2018</a:t>
             </a:fld>
             <a:endParaRPr lang="en-US" dirty="0"/>
           </a:p>
@@ -1902,7 +1902,7 @@
             <a:fld id="{4E708F12-96AD-4ED4-8132-A78F5E42C1F5}" type="datetime1">
               <a:rPr lang="en-US" smtClean="0"/>
               <a:pPr/>
-              <a:t>4/5/2018</a:t>
+              <a:t>4/6/2018</a:t>
             </a:fld>
             <a:endParaRPr lang="en-US" dirty="0"/>
           </a:p>
@@ -2106,7 +2106,7 @@
           <a:p>
             <a:fld id="{7B7FA170-8299-44AD-AEEF-FC686C3D7804}" type="datetime1">
               <a:rPr lang="en-US" smtClean="0"/>
-              <a:t>4/5/2018</a:t>
+              <a:t>4/6/2018</a:t>
             </a:fld>
             <a:endParaRPr lang="en-US" dirty="0"/>
           </a:p>
@@ -2308,7 +2308,7 @@
           <a:p>
             <a:fld id="{2231763A-68EC-4ECD-9620-D9FE9CDDD622}" type="datetime1">
               <a:rPr lang="en-US" smtClean="0"/>
-              <a:t>4/5/2018</a:t>
+              <a:t>4/6/2018</a:t>
             </a:fld>
             <a:endParaRPr lang="en-US" dirty="0"/>
           </a:p>
@@ -2502,7 +2502,7 @@
           <a:p>
             <a:fld id="{7B98BEDD-6160-49BB-B372-861DE7DE9BA5}" type="datetime1">
               <a:rPr lang="en-US" smtClean="0"/>
-              <a:t>4/5/2018</a:t>
+              <a:t>4/6/2018</a:t>
             </a:fld>
             <a:endParaRPr lang="en-US" dirty="0"/>
           </a:p>
@@ -2737,7 +2737,7 @@
           <a:p>
             <a:fld id="{0AAE819F-B7FD-4B29-8F66-9E318144BC2A}" type="datetime1">
               <a:rPr lang="en-US" smtClean="0"/>
-              <a:t>4/5/2018</a:t>
+              <a:t>4/6/2018</a:t>
             </a:fld>
             <a:endParaRPr lang="en-US" dirty="0"/>
           </a:p>
@@ -3015,7 +3015,7 @@
           <a:p>
             <a:fld id="{D4CA159C-B6E0-4F10-9F4A-2FA57003B139}" type="datetime1">
               <a:rPr lang="en-US" smtClean="0"/>
-              <a:t>4/5/2018</a:t>
+              <a:t>4/6/2018</a:t>
             </a:fld>
             <a:endParaRPr lang="en-US" dirty="0"/>
           </a:p>
@@ -3456,7 +3456,7 @@
           <a:p>
             <a:fld id="{8170CBBB-D1D1-4386-A5E9-07F3477B78F3}" type="datetime1">
               <a:rPr lang="en-US" smtClean="0"/>
-              <a:t>4/5/2018</a:t>
+              <a:t>4/6/2018</a:t>
             </a:fld>
             <a:endParaRPr lang="en-US" dirty="0"/>
           </a:p>
@@ -3611,7 +3611,7 @@
           <a:p>
             <a:fld id="{9FA4CAD8-0EA7-4615-B69B-B2F199EF3A93}" type="datetime1">
               <a:rPr lang="en-US" smtClean="0"/>
-              <a:t>4/5/2018</a:t>
+              <a:t>4/6/2018</a:t>
             </a:fld>
             <a:endParaRPr lang="en-US" dirty="0"/>
           </a:p>
@@ -3726,7 +3726,7 @@
           <a:p>
             <a:fld id="{B9234BD7-6953-492C-921B-E68B2D7F14C8}" type="datetime1">
               <a:rPr lang="en-US" smtClean="0"/>
-              <a:t>4/5/2018</a:t>
+              <a:t>4/6/2018</a:t>
             </a:fld>
             <a:endParaRPr lang="en-US" dirty="0"/>
           </a:p>
@@ -3990,7 +3990,7 @@
           <a:p>
             <a:fld id="{35A17D9B-D4D3-4E23-88DF-2E354FA43196}" type="datetime1">
               <a:rPr lang="en-US" smtClean="0"/>
-              <a:t>4/5/2018</a:t>
+              <a:t>4/6/2018</a:t>
             </a:fld>
             <a:endParaRPr lang="en-US" dirty="0"/>
           </a:p>
@@ -4253,7 +4253,7 @@
           <a:p>
             <a:fld id="{541F67C5-D04E-4576-B61C-12ABA14BBD6C}" type="datetime1">
               <a:rPr lang="en-US" smtClean="0"/>
-              <a:t>4/5/2018</a:t>
+              <a:t>4/6/2018</a:t>
             </a:fld>
             <a:endParaRPr lang="en-US" dirty="0"/>
           </a:p>
@@ -5118,7 +5118,7 @@
             <a:fld id="{C20F09E4-6EA4-4BF3-9FC8-FF40373B88E6}" type="datetime1">
               <a:rPr lang="en-US" smtClean="0"/>
               <a:pPr/>
-              <a:t>4/5/2018</a:t>
+              <a:t>4/6/2018</a:t>
             </a:fld>
             <a:endParaRPr lang="en-US" dirty="0"/>
           </a:p>
@@ -7892,8 +7892,38 @@
         </p:blipFill>
         <p:spPr>
           <a:xfrm>
-            <a:off x="6847062" y="1676400"/>
+            <a:off x="6436001" y="4311312"/>
             <a:ext cx="3248449" cy="1752600"/>
+          </a:xfrm>
+          <a:prstGeom prst="rect">
+            <a:avLst/>
+          </a:prstGeom>
+        </p:spPr>
+      </p:pic>
+      <p:pic>
+        <p:nvPicPr>
+          <p:cNvPr id="5" name="Hình ảnh 3">
+            <a:extLst>
+              <a:ext uri="{FF2B5EF4-FFF2-40B4-BE49-F238E27FC236}">
+                <a16:creationId xmlns:a16="http://schemas.microsoft.com/office/drawing/2014/main" id="{E7F8106A-A127-4022-AC77-E2A7CB2BA748}"/>
+              </a:ext>
+            </a:extLst>
+          </p:cNvPr>
+          <p:cNvPicPr>
+            <a:picLocks noChangeAspect="1"/>
+          </p:cNvPicPr>
+          <p:nvPr/>
+        </p:nvPicPr>
+        <p:blipFill>
+          <a:blip r:embed="rId4"/>
+          <a:stretch>
+            <a:fillRect/>
+          </a:stretch>
+        </p:blipFill>
+        <p:spPr>
+          <a:xfrm>
+            <a:off x="6154723" y="1389823"/>
+            <a:ext cx="5801535" cy="2019582"/>
           </a:xfrm>
           <a:prstGeom prst="rect">
             <a:avLst/>
@@ -8061,8 +8091,38 @@
         </p:blipFill>
         <p:spPr>
           <a:xfrm>
-            <a:off x="6783175" y="3121429"/>
+            <a:off x="6313391" y="4420393"/>
             <a:ext cx="2619741" cy="1324160"/>
+          </a:xfrm>
+          <a:prstGeom prst="rect">
+            <a:avLst/>
+          </a:prstGeom>
+        </p:spPr>
+      </p:pic>
+      <p:pic>
+        <p:nvPicPr>
+          <p:cNvPr id="3" name="Picture 2">
+            <a:extLst>
+              <a:ext uri="{FF2B5EF4-FFF2-40B4-BE49-F238E27FC236}">
+                <a16:creationId xmlns:a16="http://schemas.microsoft.com/office/drawing/2014/main" id="{C44F58DB-4CEC-48F0-BFD2-7625992003D0}"/>
+              </a:ext>
+            </a:extLst>
+          </p:cNvPr>
+          <p:cNvPicPr>
+            <a:picLocks noChangeAspect="1"/>
+          </p:cNvPicPr>
+          <p:nvPr/>
+        </p:nvPicPr>
+        <p:blipFill>
+          <a:blip r:embed="rId4"/>
+          <a:stretch>
+            <a:fillRect/>
+          </a:stretch>
+        </p:blipFill>
+        <p:spPr>
+          <a:xfrm>
+            <a:off x="6099660" y="2866945"/>
+            <a:ext cx="5875981" cy="1403052"/>
           </a:xfrm>
           <a:prstGeom prst="rect">
             <a:avLst/>
@@ -8198,8 +8258,8 @@
         </p:blipFill>
         <p:spPr>
           <a:xfrm>
-            <a:off x="609600" y="3208176"/>
-            <a:ext cx="5384800" cy="2424436"/>
+            <a:off x="609600" y="2495111"/>
+            <a:ext cx="5626984" cy="2533476"/>
           </a:xfrm>
           <a:prstGeom prst="rect">
             <a:avLst/>
@@ -8230,8 +8290,38 @@
         </p:blipFill>
         <p:spPr>
           <a:xfrm>
-            <a:off x="6671912" y="3208176"/>
+            <a:off x="6562855" y="4449746"/>
             <a:ext cx="2305372" cy="1667108"/>
+          </a:xfrm>
+          <a:prstGeom prst="rect">
+            <a:avLst/>
+          </a:prstGeom>
+        </p:spPr>
+      </p:pic>
+      <p:pic>
+        <p:nvPicPr>
+          <p:cNvPr id="3" name="Picture 2">
+            <a:extLst>
+              <a:ext uri="{FF2B5EF4-FFF2-40B4-BE49-F238E27FC236}">
+                <a16:creationId xmlns:a16="http://schemas.microsoft.com/office/drawing/2014/main" id="{EE6990BF-07A8-4263-94F7-049D842C5157}"/>
+              </a:ext>
+            </a:extLst>
+          </p:cNvPr>
+          <p:cNvPicPr>
+            <a:picLocks noChangeAspect="1"/>
+          </p:cNvPicPr>
+          <p:nvPr/>
+        </p:nvPicPr>
+        <p:blipFill>
+          <a:blip r:embed="rId4"/>
+          <a:stretch>
+            <a:fillRect/>
+          </a:stretch>
+        </p:blipFill>
+        <p:spPr>
+          <a:xfrm>
+            <a:off x="6287352" y="2209800"/>
+            <a:ext cx="5859707" cy="1667108"/>
           </a:xfrm>
           <a:prstGeom prst="rect">
             <a:avLst/>

</xml_diff>